<commit_message>
First opening of data, initital steps recorded in pptx
</commit_message>
<xml_diff>
--- a/DataScienceTask.pptx
+++ b/DataScienceTask.pptx
@@ -6,6 +6,8 @@
   </p:sldMasterIdLst>
   <p:sldIdLst>
     <p:sldId id="256" r:id="rId2"/>
+    <p:sldId id="257" r:id="rId3"/>
+    <p:sldId id="258" r:id="rId4"/>
   </p:sldIdLst>
   <p:sldSz cx="12192000" cy="6858000"/>
   <p:notesSz cx="6858000" cy="9144000"/>
@@ -104,6 +106,11 @@
       </a:defRPr>
     </a:lvl9pPr>
   </p:defaultTextStyle>
+  <p:extLst>
+    <p:ext uri="{EFAFB233-063F-42B5-8137-9DF3F51BA10A}">
+      <p15:sldGuideLst xmlns:p15="http://schemas.microsoft.com/office/powerpoint/2012/main"/>
+    </p:ext>
+  </p:extLst>
 </p:presentation>
 </file>
 
@@ -3342,53 +3349,77 @@
           <a:chExt cx="0" cy="0"/>
         </a:xfrm>
       </p:grpSpPr>
-      <p:sp>
-        <p:nvSpPr>
-          <p:cNvPr id="2" name="Title 1">
-            <a:extLst>
-              <a:ext uri="{FF2B5EF4-FFF2-40B4-BE49-F238E27FC236}">
-                <a16:creationId xmlns:a16="http://schemas.microsoft.com/office/drawing/2014/main" id="{2EE9B569-4FC7-495C-9815-A1B3FE4A5EBB}"/>
-              </a:ext>
-            </a:extLst>
-          </p:cNvPr>
-          <p:cNvSpPr>
-            <a:spLocks noGrp="1"/>
-          </p:cNvSpPr>
-          <p:nvPr>
-            <p:ph type="ctrTitle"/>
-          </p:nvPr>
-        </p:nvSpPr>
-        <p:spPr/>
-        <p:txBody>
-          <a:bodyPr/>
-          <a:lstStyle/>
-          <a:p>
-            <a:endParaRPr lang="en-GB"/>
-          </a:p>
-        </p:txBody>
-      </p:sp>
-      <p:sp>
-        <p:nvSpPr>
-          <p:cNvPr id="3" name="Subtitle 2">
-            <a:extLst>
-              <a:ext uri="{FF2B5EF4-FFF2-40B4-BE49-F238E27FC236}">
-                <a16:creationId xmlns:a16="http://schemas.microsoft.com/office/drawing/2014/main" id="{2EF05170-A917-48FF-B26B-842749C3FD0B}"/>
-              </a:ext>
-            </a:extLst>
-          </p:cNvPr>
-          <p:cNvSpPr>
-            <a:spLocks noGrp="1"/>
-          </p:cNvSpPr>
-          <p:nvPr>
-            <p:ph type="subTitle" idx="1"/>
-          </p:nvPr>
-        </p:nvSpPr>
-        <p:spPr/>
-        <p:txBody>
-          <a:bodyPr/>
-          <a:lstStyle/>
-          <a:p>
-            <a:endParaRPr lang="en-GB"/>
+      <p:pic>
+        <p:nvPicPr>
+          <p:cNvPr id="5" name="Picture 4">
+            <a:extLst>
+              <a:ext uri="{FF2B5EF4-FFF2-40B4-BE49-F238E27FC236}">
+                <a16:creationId xmlns:a16="http://schemas.microsoft.com/office/drawing/2014/main" id="{BD89DE80-6B79-4063-9026-855BB205F81A}"/>
+              </a:ext>
+            </a:extLst>
+          </p:cNvPr>
+          <p:cNvPicPr>
+            <a:picLocks noChangeAspect="1"/>
+          </p:cNvPicPr>
+          <p:nvPr/>
+        </p:nvPicPr>
+        <p:blipFill>
+          <a:blip r:embed="rId2"/>
+          <a:stretch>
+            <a:fillRect/>
+          </a:stretch>
+        </p:blipFill>
+        <p:spPr>
+          <a:xfrm>
+            <a:off x="508096" y="1061114"/>
+            <a:ext cx="6904489" cy="4735771"/>
+          </a:xfrm>
+          <a:prstGeom prst="rect">
+            <a:avLst/>
+          </a:prstGeom>
+        </p:spPr>
+      </p:pic>
+      <p:sp>
+        <p:nvSpPr>
+          <p:cNvPr id="6" name="TextBox 5">
+            <a:extLst>
+              <a:ext uri="{FF2B5EF4-FFF2-40B4-BE49-F238E27FC236}">
+                <a16:creationId xmlns:a16="http://schemas.microsoft.com/office/drawing/2014/main" id="{50A3A222-4832-4BAF-81C2-D9F37FDC1CE8}"/>
+              </a:ext>
+            </a:extLst>
+          </p:cNvPr>
+          <p:cNvSpPr txBox="1"/>
+          <p:nvPr/>
+        </p:nvSpPr>
+        <p:spPr>
+          <a:xfrm>
+            <a:off x="7833674" y="1061114"/>
+            <a:ext cx="3487918" cy="1200329"/>
+          </a:xfrm>
+          <a:prstGeom prst="rect">
+            <a:avLst/>
+          </a:prstGeom>
+          <a:noFill/>
+        </p:spPr>
+        <p:txBody>
+          <a:bodyPr wrap="square" rtlCol="0">
+            <a:spAutoFit/>
+          </a:bodyPr>
+          <a:lstStyle/>
+          <a:p>
+            <a:r>
+              <a:rPr lang="en-GB" dirty="0"/>
+              <a:t>First step – what is the data? </a:t>
+            </a:r>
+          </a:p>
+          <a:p>
+            <a:endParaRPr lang="en-GB" dirty="0"/>
+          </a:p>
+          <a:p>
+            <a:r>
+              <a:rPr lang="en-GB" dirty="0"/>
+              <a:t>For a simple file like this, first open in Notepad++</a:t>
+            </a:r>
           </a:p>
         </p:txBody>
       </p:sp>
@@ -3396,6 +3427,293 @@
     <p:extLst>
       <p:ext uri="{BB962C8B-B14F-4D97-AF65-F5344CB8AC3E}">
         <p14:creationId xmlns:p14="http://schemas.microsoft.com/office/powerpoint/2010/main" val="4136125505"/>
+      </p:ext>
+    </p:extLst>
+  </p:cSld>
+  <p:clrMapOvr>
+    <a:masterClrMapping/>
+  </p:clrMapOvr>
+</p:sld>
+</file>
+
+<file path=ppt/slides/slide2.xml><?xml version="1.0" encoding="utf-8"?>
+<p:sld xmlns:a="http://schemas.openxmlformats.org/drawingml/2006/main" xmlns:r="http://schemas.openxmlformats.org/officeDocument/2006/relationships" xmlns:p="http://schemas.openxmlformats.org/presentationml/2006/main">
+  <p:cSld>
+    <p:spTree>
+      <p:nvGrpSpPr>
+        <p:cNvPr id="1" name=""/>
+        <p:cNvGrpSpPr/>
+        <p:nvPr/>
+      </p:nvGrpSpPr>
+      <p:grpSpPr>
+        <a:xfrm>
+          <a:off x="0" y="0"/>
+          <a:ext cx="0" cy="0"/>
+          <a:chOff x="0" y="0"/>
+          <a:chExt cx="0" cy="0"/>
+        </a:xfrm>
+      </p:grpSpPr>
+      <p:sp>
+        <p:nvSpPr>
+          <p:cNvPr id="4" name="TextBox 3">
+            <a:extLst>
+              <a:ext uri="{FF2B5EF4-FFF2-40B4-BE49-F238E27FC236}">
+                <a16:creationId xmlns:a16="http://schemas.microsoft.com/office/drawing/2014/main" id="{EAA8AA37-FB88-4B4F-A47E-0F9BFF72581F}"/>
+              </a:ext>
+            </a:extLst>
+          </p:cNvPr>
+          <p:cNvSpPr txBox="1"/>
+          <p:nvPr/>
+        </p:nvSpPr>
+        <p:spPr>
+          <a:xfrm>
+            <a:off x="7211505" y="461913"/>
+            <a:ext cx="4081806" cy="2862322"/>
+          </a:xfrm>
+          <a:prstGeom prst="rect">
+            <a:avLst/>
+          </a:prstGeom>
+          <a:noFill/>
+        </p:spPr>
+        <p:txBody>
+          <a:bodyPr wrap="square" rtlCol="0">
+            <a:spAutoFit/>
+          </a:bodyPr>
+          <a:lstStyle/>
+          <a:p>
+            <a:r>
+              <a:rPr lang="en-GB" dirty="0"/>
+              <a:t>After identifying this is a standard comma delimited data file, import it into your language of choice – here I am using Python with the Pandas module (for simple tabular data handling)</a:t>
+            </a:r>
+          </a:p>
+          <a:p>
+            <a:endParaRPr lang="en-GB" dirty="0"/>
+          </a:p>
+          <a:p>
+            <a:r>
+              <a:rPr lang="en-GB" dirty="0"/>
+              <a:t>Automatically using the first row as the header (the values of the first row are different from the rest of the column and appear like a header)</a:t>
+            </a:r>
+          </a:p>
+        </p:txBody>
+      </p:sp>
+      <p:pic>
+        <p:nvPicPr>
+          <p:cNvPr id="8" name="Picture 7">
+            <a:extLst>
+              <a:ext uri="{FF2B5EF4-FFF2-40B4-BE49-F238E27FC236}">
+                <a16:creationId xmlns:a16="http://schemas.microsoft.com/office/drawing/2014/main" id="{CBA2BBD1-3544-4A01-9AED-244EFF0A1FC0}"/>
+              </a:ext>
+            </a:extLst>
+          </p:cNvPr>
+          <p:cNvPicPr>
+            <a:picLocks noChangeAspect="1"/>
+          </p:cNvPicPr>
+          <p:nvPr/>
+        </p:nvPicPr>
+        <p:blipFill>
+          <a:blip r:embed="rId2"/>
+          <a:stretch>
+            <a:fillRect/>
+          </a:stretch>
+        </p:blipFill>
+        <p:spPr>
+          <a:xfrm>
+            <a:off x="584462" y="125304"/>
+            <a:ext cx="5392132" cy="2896532"/>
+          </a:xfrm>
+          <a:prstGeom prst="rect">
+            <a:avLst/>
+          </a:prstGeom>
+        </p:spPr>
+      </p:pic>
+      <p:pic>
+        <p:nvPicPr>
+          <p:cNvPr id="10" name="Picture 9">
+            <a:extLst>
+              <a:ext uri="{FF2B5EF4-FFF2-40B4-BE49-F238E27FC236}">
+                <a16:creationId xmlns:a16="http://schemas.microsoft.com/office/drawing/2014/main" id="{4E003A56-71F8-4383-9171-B6E4ECAFC662}"/>
+              </a:ext>
+            </a:extLst>
+          </p:cNvPr>
+          <p:cNvPicPr>
+            <a:picLocks noChangeAspect="1"/>
+          </p:cNvPicPr>
+          <p:nvPr/>
+        </p:nvPicPr>
+        <p:blipFill>
+          <a:blip r:embed="rId3"/>
+          <a:stretch>
+            <a:fillRect/>
+          </a:stretch>
+        </p:blipFill>
+        <p:spPr>
+          <a:xfrm>
+            <a:off x="584462" y="3429000"/>
+            <a:ext cx="5392132" cy="2896533"/>
+          </a:xfrm>
+          <a:prstGeom prst="rect">
+            <a:avLst/>
+          </a:prstGeom>
+        </p:spPr>
+      </p:pic>
+      <p:sp>
+        <p:nvSpPr>
+          <p:cNvPr id="11" name="TextBox 10">
+            <a:extLst>
+              <a:ext uri="{FF2B5EF4-FFF2-40B4-BE49-F238E27FC236}">
+                <a16:creationId xmlns:a16="http://schemas.microsoft.com/office/drawing/2014/main" id="{63ADA1CA-9DCD-46C9-B665-D1BDF47066C0}"/>
+              </a:ext>
+            </a:extLst>
+          </p:cNvPr>
+          <p:cNvSpPr txBox="1"/>
+          <p:nvPr/>
+        </p:nvSpPr>
+        <p:spPr>
+          <a:xfrm>
+            <a:off x="7211505" y="4191187"/>
+            <a:ext cx="4399173" cy="923330"/>
+          </a:xfrm>
+          <a:prstGeom prst="rect">
+            <a:avLst/>
+          </a:prstGeom>
+          <a:noFill/>
+        </p:spPr>
+        <p:txBody>
+          <a:bodyPr wrap="square" rtlCol="0">
+            <a:spAutoFit/>
+          </a:bodyPr>
+          <a:lstStyle/>
+          <a:p>
+            <a:r>
+              <a:rPr lang="en-GB" dirty="0"/>
+              <a:t>One thing I noticed is that the Income field has </a:t>
+            </a:r>
+            <a:r>
+              <a:rPr lang="en-GB" dirty="0" err="1"/>
+              <a:t>NaN</a:t>
+            </a:r>
+            <a:r>
+              <a:rPr lang="en-GB" dirty="0"/>
+              <a:t> entries in the income field. Knowing this I did a full check of the data.</a:t>
+            </a:r>
+          </a:p>
+        </p:txBody>
+      </p:sp>
+    </p:spTree>
+    <p:extLst>
+      <p:ext uri="{BB962C8B-B14F-4D97-AF65-F5344CB8AC3E}">
+        <p14:creationId xmlns:p14="http://schemas.microsoft.com/office/powerpoint/2010/main" val="3725267084"/>
+      </p:ext>
+    </p:extLst>
+  </p:cSld>
+  <p:clrMapOvr>
+    <a:masterClrMapping/>
+  </p:clrMapOvr>
+</p:sld>
+</file>
+
+<file path=ppt/slides/slide3.xml><?xml version="1.0" encoding="utf-8"?>
+<p:sld xmlns:a="http://schemas.openxmlformats.org/drawingml/2006/main" xmlns:r="http://schemas.openxmlformats.org/officeDocument/2006/relationships" xmlns:p="http://schemas.openxmlformats.org/presentationml/2006/main">
+  <p:cSld>
+    <p:spTree>
+      <p:nvGrpSpPr>
+        <p:cNvPr id="1" name=""/>
+        <p:cNvGrpSpPr/>
+        <p:nvPr/>
+      </p:nvGrpSpPr>
+      <p:grpSpPr>
+        <a:xfrm>
+          <a:off x="0" y="0"/>
+          <a:ext cx="0" cy="0"/>
+          <a:chOff x="0" y="0"/>
+          <a:chExt cx="0" cy="0"/>
+        </a:xfrm>
+      </p:grpSpPr>
+      <p:pic>
+        <p:nvPicPr>
+          <p:cNvPr id="7" name="Picture 6">
+            <a:extLst>
+              <a:ext uri="{FF2B5EF4-FFF2-40B4-BE49-F238E27FC236}">
+                <a16:creationId xmlns:a16="http://schemas.microsoft.com/office/drawing/2014/main" id="{5A6C4110-3389-4D2B-BC18-18C9635EC2D8}"/>
+              </a:ext>
+            </a:extLst>
+          </p:cNvPr>
+          <p:cNvPicPr>
+            <a:picLocks noChangeAspect="1"/>
+          </p:cNvPicPr>
+          <p:nvPr/>
+        </p:nvPicPr>
+        <p:blipFill rotWithShape="1">
+          <a:blip r:embed="rId2"/>
+          <a:srcRect l="66904" t="4103" b="39816"/>
+          <a:stretch/>
+        </p:blipFill>
+        <p:spPr>
+          <a:xfrm>
+            <a:off x="311085" y="607418"/>
+            <a:ext cx="6089715" cy="5643163"/>
+          </a:xfrm>
+          <a:prstGeom prst="rect">
+            <a:avLst/>
+          </a:prstGeom>
+        </p:spPr>
+      </p:pic>
+      <p:sp>
+        <p:nvSpPr>
+          <p:cNvPr id="8" name="TextBox 7">
+            <a:extLst>
+              <a:ext uri="{FF2B5EF4-FFF2-40B4-BE49-F238E27FC236}">
+                <a16:creationId xmlns:a16="http://schemas.microsoft.com/office/drawing/2014/main" id="{A6C8D359-448A-4D13-85A1-C67CC2FD8C1D}"/>
+              </a:ext>
+            </a:extLst>
+          </p:cNvPr>
+          <p:cNvSpPr txBox="1"/>
+          <p:nvPr/>
+        </p:nvSpPr>
+        <p:spPr>
+          <a:xfrm>
+            <a:off x="7391046" y="727421"/>
+            <a:ext cx="3757922" cy="2308324"/>
+          </a:xfrm>
+          <a:prstGeom prst="rect">
+            <a:avLst/>
+          </a:prstGeom>
+          <a:noFill/>
+        </p:spPr>
+        <p:txBody>
+          <a:bodyPr wrap="square" rtlCol="0">
+            <a:spAutoFit/>
+          </a:bodyPr>
+          <a:lstStyle/>
+          <a:p>
+            <a:r>
+              <a:rPr lang="en-GB" dirty="0" err="1"/>
+              <a:t>SciView</a:t>
+            </a:r>
+            <a:r>
+              <a:rPr lang="en-GB" dirty="0"/>
+              <a:t> in PyCharm has some very good debug and data review tools, I was looking through the data in table view.</a:t>
+            </a:r>
+          </a:p>
+          <a:p>
+            <a:endParaRPr lang="en-GB" dirty="0"/>
+          </a:p>
+          <a:p>
+            <a:r>
+              <a:rPr lang="en-GB" dirty="0"/>
+              <a:t>Multiple columns have nan values – primarily rows 443-569</a:t>
+            </a:r>
+          </a:p>
+          <a:p>
+            <a:endParaRPr lang="en-GB" dirty="0"/>
+          </a:p>
+        </p:txBody>
+      </p:sp>
+    </p:spTree>
+    <p:extLst>
+      <p:ext uri="{BB962C8B-B14F-4D97-AF65-F5344CB8AC3E}">
+        <p14:creationId xmlns:p14="http://schemas.microsoft.com/office/powerpoint/2010/main" val="278120141"/>
       </p:ext>
     </p:extLst>
   </p:cSld>

</xml_diff>

<commit_message>
explaining collinearity and PCA implementation
</commit_message>
<xml_diff>
--- a/DataScienceTask.pptx
+++ b/DataScienceTask.pptx
@@ -7,7 +7,8 @@
   <p:sldIdLst>
     <p:sldId id="256" r:id="rId2"/>
     <p:sldId id="257" r:id="rId3"/>
-    <p:sldId id="258" r:id="rId4"/>
+    <p:sldId id="259" r:id="rId4"/>
+    <p:sldId id="258" r:id="rId5"/>
   </p:sldIdLst>
   <p:sldSz cx="12192000" cy="6858000"/>
   <p:notesSz cx="6858000" cy="9144000"/>
@@ -3394,7 +3395,7 @@
         <p:spPr>
           <a:xfrm>
             <a:off x="7833674" y="1061114"/>
-            <a:ext cx="3487918" cy="1200329"/>
+            <a:ext cx="3487918" cy="3139321"/>
           </a:xfrm>
           <a:prstGeom prst="rect">
             <a:avLst/>
@@ -3419,6 +3420,15 @@
             <a:r>
               <a:rPr lang="en-GB" dirty="0"/>
               <a:t>For a simple file like this, first open in Notepad++</a:t>
+            </a:r>
+          </a:p>
+          <a:p>
+            <a:endParaRPr lang="en-GB" dirty="0"/>
+          </a:p>
+          <a:p>
+            <a:r>
+              <a:rPr lang="en-GB" dirty="0"/>
+              <a:t>First thoughts: comma delimited file with newlines indicating new rows. First row is a header row with no consistent naming structure (some have underscores, some use spaces)</a:t>
             </a:r>
           </a:p>
         </p:txBody>
@@ -3614,6 +3624,442 @@
 </file>
 
 <file path=ppt/slides/slide3.xml><?xml version="1.0" encoding="utf-8"?>
+<p:sld xmlns:a="http://schemas.openxmlformats.org/drawingml/2006/main" xmlns:r="http://schemas.openxmlformats.org/officeDocument/2006/relationships" xmlns:p="http://schemas.openxmlformats.org/presentationml/2006/main">
+  <p:cSld>
+    <p:spTree>
+      <p:nvGrpSpPr>
+        <p:cNvPr id="1" name=""/>
+        <p:cNvGrpSpPr/>
+        <p:nvPr/>
+      </p:nvGrpSpPr>
+      <p:grpSpPr>
+        <a:xfrm>
+          <a:off x="0" y="0"/>
+          <a:ext cx="0" cy="0"/>
+          <a:chOff x="0" y="0"/>
+          <a:chExt cx="0" cy="0"/>
+        </a:xfrm>
+      </p:grpSpPr>
+      <p:sp>
+        <p:nvSpPr>
+          <p:cNvPr id="5" name="TextBox 4">
+            <a:extLst>
+              <a:ext uri="{FF2B5EF4-FFF2-40B4-BE49-F238E27FC236}">
+                <a16:creationId xmlns:a16="http://schemas.microsoft.com/office/drawing/2014/main" id="{D23FF2E0-9CF0-45AA-A09D-A3C1BEB4248A}"/>
+              </a:ext>
+            </a:extLst>
+          </p:cNvPr>
+          <p:cNvSpPr txBox="1"/>
+          <p:nvPr/>
+        </p:nvSpPr>
+        <p:spPr>
+          <a:xfrm>
+            <a:off x="497048" y="518549"/>
+            <a:ext cx="6094602" cy="5355312"/>
+          </a:xfrm>
+          <a:prstGeom prst="rect">
+            <a:avLst/>
+          </a:prstGeom>
+          <a:noFill/>
+        </p:spPr>
+        <p:txBody>
+          <a:bodyPr wrap="square">
+            <a:spAutoFit/>
+          </a:bodyPr>
+          <a:lstStyle/>
+          <a:p>
+            <a:r>
+              <a:rPr lang="en-GB" dirty="0"/>
+              <a:t>data.info()</a:t>
+            </a:r>
+          </a:p>
+          <a:p>
+            <a:r>
+              <a:rPr lang="en-GB" dirty="0"/>
+              <a:t>&lt;class '</a:t>
+            </a:r>
+            <a:r>
+              <a:rPr lang="en-GB" dirty="0" err="1"/>
+              <a:t>pandas.core.frame.DataFrame</a:t>
+            </a:r>
+            <a:r>
+              <a:rPr lang="en-GB" dirty="0"/>
+              <a:t>'&gt;</a:t>
+            </a:r>
+          </a:p>
+          <a:p>
+            <a:r>
+              <a:rPr lang="en-GB" dirty="0" err="1"/>
+              <a:t>RangeIndex</a:t>
+            </a:r>
+            <a:r>
+              <a:rPr lang="en-GB" dirty="0"/>
+              <a:t>: 569 entries, 0 to 568</a:t>
+            </a:r>
+          </a:p>
+          <a:p>
+            <a:r>
+              <a:rPr lang="en-GB" dirty="0"/>
+              <a:t>Data columns (total 13 columns):</a:t>
+            </a:r>
+          </a:p>
+          <a:p>
+            <a:r>
+              <a:rPr lang="en-GB" dirty="0" err="1"/>
+              <a:t>bank_acc_bal</a:t>
+            </a:r>
+            <a:r>
+              <a:rPr lang="en-GB" dirty="0"/>
+              <a:t>            569 non-null float64</a:t>
+            </a:r>
+          </a:p>
+          <a:p>
+            <a:r>
+              <a:rPr lang="en-GB" dirty="0" err="1"/>
+              <a:t>avg_loan_val</a:t>
+            </a:r>
+            <a:r>
+              <a:rPr lang="en-GB" dirty="0"/>
+              <a:t>            569 non-null float64</a:t>
+            </a:r>
+          </a:p>
+          <a:p>
+            <a:r>
+              <a:rPr lang="en-GB" dirty="0"/>
+              <a:t>spend perc </a:t>
+            </a:r>
+            <a:r>
+              <a:rPr lang="en-GB" dirty="0" err="1"/>
+              <a:t>SuperMkt</a:t>
+            </a:r>
+            <a:r>
+              <a:rPr lang="en-GB" dirty="0"/>
+              <a:t>     569 non-null float64</a:t>
+            </a:r>
+          </a:p>
+          <a:p>
+            <a:r>
+              <a:rPr lang="en-GB" dirty="0"/>
+              <a:t>perc spend Fuel         569 non-null float64</a:t>
+            </a:r>
+          </a:p>
+          <a:p>
+            <a:r>
+              <a:rPr lang="en-GB" dirty="0"/>
+              <a:t>Years with bank         569 non-null float64</a:t>
+            </a:r>
+          </a:p>
+          <a:p>
+            <a:r>
+              <a:rPr lang="en-GB" dirty="0"/>
+              <a:t>loan amount             569 non-null float64</a:t>
+            </a:r>
+          </a:p>
+          <a:p>
+            <a:r>
+              <a:rPr lang="en-GB" dirty="0" err="1"/>
+              <a:t>val</a:t>
+            </a:r>
+            <a:r>
+              <a:rPr lang="en-GB" dirty="0"/>
+              <a:t> of </a:t>
+            </a:r>
+            <a:r>
+              <a:rPr lang="en-GB" dirty="0" err="1"/>
+              <a:t>propertY</a:t>
+            </a:r>
+            <a:r>
+              <a:rPr lang="en-GB" dirty="0"/>
+              <a:t>         569 non-null float64</a:t>
+            </a:r>
+          </a:p>
+          <a:p>
+            <a:r>
+              <a:rPr lang="en-GB" dirty="0"/>
+              <a:t>Age                     442 non-null float64</a:t>
+            </a:r>
+          </a:p>
+          <a:p>
+            <a:r>
+              <a:rPr lang="en-GB" dirty="0"/>
+              <a:t>Gender                  442 </a:t>
+            </a:r>
+            <a:r>
+              <a:rPr lang="en-GB" b="1" dirty="0"/>
+              <a:t>non-null object</a:t>
+            </a:r>
+          </a:p>
+          <a:p>
+            <a:r>
+              <a:rPr lang="en-GB" dirty="0" err="1"/>
+              <a:t>prev_Salary</a:t>
+            </a:r>
+            <a:r>
+              <a:rPr lang="en-GB" dirty="0"/>
+              <a:t>             442 non-null float64</a:t>
+            </a:r>
+          </a:p>
+          <a:p>
+            <a:r>
+              <a:rPr lang="en-GB" dirty="0" err="1"/>
+              <a:t>last_Bonus</a:t>
+            </a:r>
+            <a:r>
+              <a:rPr lang="en-GB" dirty="0"/>
+              <a:t>              442 non-null float64</a:t>
+            </a:r>
+          </a:p>
+          <a:p>
+            <a:r>
+              <a:rPr lang="en-GB" dirty="0"/>
+              <a:t>Income                  442 non-null float64</a:t>
+            </a:r>
+          </a:p>
+          <a:p>
+            <a:r>
+              <a:rPr lang="en-GB" dirty="0"/>
+              <a:t>target                  569 </a:t>
+            </a:r>
+            <a:r>
+              <a:rPr lang="en-GB" b="1" dirty="0"/>
+              <a:t>non-null object</a:t>
+            </a:r>
+          </a:p>
+          <a:p>
+            <a:r>
+              <a:rPr lang="en-GB" dirty="0" err="1"/>
+              <a:t>dtypes</a:t>
+            </a:r>
+            <a:r>
+              <a:rPr lang="en-GB" dirty="0"/>
+              <a:t>: float64(11), object(2)</a:t>
+            </a:r>
+          </a:p>
+          <a:p>
+            <a:r>
+              <a:rPr lang="en-GB" dirty="0"/>
+              <a:t>memory usage: 57.9+ KB</a:t>
+            </a:r>
+          </a:p>
+        </p:txBody>
+      </p:sp>
+      <p:pic>
+        <p:nvPicPr>
+          <p:cNvPr id="7" name="Picture 6">
+            <a:extLst>
+              <a:ext uri="{FF2B5EF4-FFF2-40B4-BE49-F238E27FC236}">
+                <a16:creationId xmlns:a16="http://schemas.microsoft.com/office/drawing/2014/main" id="{A67FD106-9AC0-4C16-AD76-F55491B2957F}"/>
+              </a:ext>
+            </a:extLst>
+          </p:cNvPr>
+          <p:cNvPicPr>
+            <a:picLocks noChangeAspect="1"/>
+          </p:cNvPicPr>
+          <p:nvPr/>
+        </p:nvPicPr>
+        <p:blipFill>
+          <a:blip r:embed="rId2"/>
+          <a:stretch>
+            <a:fillRect/>
+          </a:stretch>
+        </p:blipFill>
+        <p:spPr>
+          <a:xfrm>
+            <a:off x="5135692" y="637302"/>
+            <a:ext cx="6914906" cy="1044849"/>
+          </a:xfrm>
+          <a:prstGeom prst="rect">
+            <a:avLst/>
+          </a:prstGeom>
+        </p:spPr>
+      </p:pic>
+      <p:pic>
+        <p:nvPicPr>
+          <p:cNvPr id="9" name="Picture 8">
+            <a:extLst>
+              <a:ext uri="{FF2B5EF4-FFF2-40B4-BE49-F238E27FC236}">
+                <a16:creationId xmlns:a16="http://schemas.microsoft.com/office/drawing/2014/main" id="{11BDE10D-36D2-40A4-AE80-953FBC1B3B6F}"/>
+              </a:ext>
+            </a:extLst>
+          </p:cNvPr>
+          <p:cNvPicPr>
+            <a:picLocks noChangeAspect="1"/>
+          </p:cNvPicPr>
+          <p:nvPr/>
+        </p:nvPicPr>
+        <p:blipFill>
+          <a:blip r:embed="rId3"/>
+          <a:stretch>
+            <a:fillRect/>
+          </a:stretch>
+        </p:blipFill>
+        <p:spPr>
+          <a:xfrm>
+            <a:off x="6096000" y="2266950"/>
+            <a:ext cx="4695825" cy="1162050"/>
+          </a:xfrm>
+          <a:prstGeom prst="rect">
+            <a:avLst/>
+          </a:prstGeom>
+        </p:spPr>
+      </p:pic>
+      <p:sp>
+        <p:nvSpPr>
+          <p:cNvPr id="15" name="TextBox 14">
+            <a:extLst>
+              <a:ext uri="{FF2B5EF4-FFF2-40B4-BE49-F238E27FC236}">
+                <a16:creationId xmlns:a16="http://schemas.microsoft.com/office/drawing/2014/main" id="{F6227A70-BCF4-4AA2-9161-CDB6287CBB73}"/>
+              </a:ext>
+            </a:extLst>
+          </p:cNvPr>
+          <p:cNvSpPr txBox="1"/>
+          <p:nvPr/>
+        </p:nvSpPr>
+        <p:spPr>
+          <a:xfrm>
+            <a:off x="5018713" y="2847975"/>
+            <a:ext cx="6094602" cy="3693319"/>
+          </a:xfrm>
+          <a:prstGeom prst="rect">
+            <a:avLst/>
+          </a:prstGeom>
+          <a:noFill/>
+        </p:spPr>
+        <p:txBody>
+          <a:bodyPr wrap="square">
+            <a:spAutoFit/>
+          </a:bodyPr>
+          <a:lstStyle/>
+          <a:p>
+            <a:r>
+              <a:rPr lang="en-GB" dirty="0" err="1"/>
+              <a:t>bank_acc_bal</a:t>
+            </a:r>
+            <a:r>
+              <a:rPr lang="en-GB" dirty="0"/>
+              <a:t>              0</a:t>
+            </a:r>
+          </a:p>
+          <a:p>
+            <a:r>
+              <a:rPr lang="en-GB" dirty="0" err="1"/>
+              <a:t>avg_loan_val</a:t>
+            </a:r>
+            <a:r>
+              <a:rPr lang="en-GB" dirty="0"/>
+              <a:t>              0</a:t>
+            </a:r>
+          </a:p>
+          <a:p>
+            <a:r>
+              <a:rPr lang="en-GB" dirty="0"/>
+              <a:t>spend perc </a:t>
+            </a:r>
+            <a:r>
+              <a:rPr lang="en-GB" dirty="0" err="1"/>
+              <a:t>SuperMkt</a:t>
+            </a:r>
+            <a:r>
+              <a:rPr lang="en-GB" dirty="0"/>
+              <a:t>       0</a:t>
+            </a:r>
+          </a:p>
+          <a:p>
+            <a:r>
+              <a:rPr lang="en-GB" dirty="0"/>
+              <a:t>perc spend Fuel           0</a:t>
+            </a:r>
+          </a:p>
+          <a:p>
+            <a:r>
+              <a:rPr lang="en-GB" dirty="0"/>
+              <a:t>Years with bank           0</a:t>
+            </a:r>
+          </a:p>
+          <a:p>
+            <a:r>
+              <a:rPr lang="en-GB" dirty="0"/>
+              <a:t>loan amount               0</a:t>
+            </a:r>
+          </a:p>
+          <a:p>
+            <a:r>
+              <a:rPr lang="en-GB" dirty="0" err="1"/>
+              <a:t>val</a:t>
+            </a:r>
+            <a:r>
+              <a:rPr lang="en-GB" dirty="0"/>
+              <a:t> of </a:t>
+            </a:r>
+            <a:r>
+              <a:rPr lang="en-GB" dirty="0" err="1"/>
+              <a:t>propertY</a:t>
+            </a:r>
+            <a:r>
+              <a:rPr lang="en-GB" dirty="0"/>
+              <a:t>           0</a:t>
+            </a:r>
+          </a:p>
+          <a:p>
+            <a:r>
+              <a:rPr lang="en-GB" dirty="0"/>
+              <a:t>Age                     127</a:t>
+            </a:r>
+          </a:p>
+          <a:p>
+            <a:r>
+              <a:rPr lang="en-GB" dirty="0"/>
+              <a:t>Gender                  127</a:t>
+            </a:r>
+          </a:p>
+          <a:p>
+            <a:r>
+              <a:rPr lang="en-GB" dirty="0" err="1"/>
+              <a:t>prev_Salary</a:t>
+            </a:r>
+            <a:r>
+              <a:rPr lang="en-GB" dirty="0"/>
+              <a:t>             127</a:t>
+            </a:r>
+          </a:p>
+          <a:p>
+            <a:r>
+              <a:rPr lang="en-GB" dirty="0" err="1"/>
+              <a:t>last_Bonus</a:t>
+            </a:r>
+            <a:r>
+              <a:rPr lang="en-GB" dirty="0"/>
+              <a:t>              127</a:t>
+            </a:r>
+          </a:p>
+          <a:p>
+            <a:r>
+              <a:rPr lang="en-GB" dirty="0"/>
+              <a:t>Income                  127</a:t>
+            </a:r>
+          </a:p>
+          <a:p>
+            <a:r>
+              <a:rPr lang="en-GB" dirty="0"/>
+              <a:t>target                    0</a:t>
+            </a:r>
+          </a:p>
+        </p:txBody>
+      </p:sp>
+    </p:spTree>
+    <p:extLst>
+      <p:ext uri="{BB962C8B-B14F-4D97-AF65-F5344CB8AC3E}">
+        <p14:creationId xmlns:p14="http://schemas.microsoft.com/office/powerpoint/2010/main" val="4280238964"/>
+      </p:ext>
+    </p:extLst>
+  </p:cSld>
+  <p:clrMapOvr>
+    <a:masterClrMapping/>
+  </p:clrMapOvr>
+</p:sld>
+</file>
+
+<file path=ppt/slides/slide4.xml><?xml version="1.0" encoding="utf-8"?>
 <p:sld xmlns:a="http://schemas.openxmlformats.org/drawingml/2006/main" xmlns:r="http://schemas.openxmlformats.org/officeDocument/2006/relationships" xmlns:p="http://schemas.openxmlformats.org/presentationml/2006/main">
   <p:cSld>
     <p:spTree>

</xml_diff>